<commit_message>
[UPDATE] UserInfo 수정 구현
</commit_message>
<xml_diff>
--- a/ClassManager디자인.pptx
+++ b/ClassManager디자인.pptx
@@ -198,7 +198,7 @@
           <a:p>
             <a:fld id="{2FDFBD7D-7E94-464D-A11A-331876AFB436}" type="datetimeFigureOut">
               <a:rPr lang="ko-KR" altLang="en-US" smtClean="0"/>
-              <a:t>2021-02-06</a:t>
+              <a:t>2021-03-16</a:t>
             </a:fld>
             <a:endParaRPr lang="ko-KR" altLang="en-US"/>
           </a:p>
@@ -780,7 +780,7 @@
           <a:p>
             <a:fld id="{E4F1AEBE-7935-4C38-B7AE-36725F38EF0D}" type="datetimeFigureOut">
               <a:rPr lang="ko-KR" altLang="en-US" smtClean="0"/>
-              <a:t>2021-02-06</a:t>
+              <a:t>2021-03-16</a:t>
             </a:fld>
             <a:endParaRPr lang="ko-KR" altLang="en-US"/>
           </a:p>
@@ -978,7 +978,7 @@
           <a:p>
             <a:fld id="{E4F1AEBE-7935-4C38-B7AE-36725F38EF0D}" type="datetimeFigureOut">
               <a:rPr lang="ko-KR" altLang="en-US" smtClean="0"/>
-              <a:t>2021-02-06</a:t>
+              <a:t>2021-03-16</a:t>
             </a:fld>
             <a:endParaRPr lang="ko-KR" altLang="en-US"/>
           </a:p>
@@ -1186,7 +1186,7 @@
           <a:p>
             <a:fld id="{E4F1AEBE-7935-4C38-B7AE-36725F38EF0D}" type="datetimeFigureOut">
               <a:rPr lang="ko-KR" altLang="en-US" smtClean="0"/>
-              <a:t>2021-02-06</a:t>
+              <a:t>2021-03-16</a:t>
             </a:fld>
             <a:endParaRPr lang="ko-KR" altLang="en-US"/>
           </a:p>
@@ -1384,7 +1384,7 @@
           <a:p>
             <a:fld id="{E4F1AEBE-7935-4C38-B7AE-36725F38EF0D}" type="datetimeFigureOut">
               <a:rPr lang="ko-KR" altLang="en-US" smtClean="0"/>
-              <a:t>2021-02-06</a:t>
+              <a:t>2021-03-16</a:t>
             </a:fld>
             <a:endParaRPr lang="ko-KR" altLang="en-US"/>
           </a:p>
@@ -1659,7 +1659,7 @@
           <a:p>
             <a:fld id="{E4F1AEBE-7935-4C38-B7AE-36725F38EF0D}" type="datetimeFigureOut">
               <a:rPr lang="ko-KR" altLang="en-US" smtClean="0"/>
-              <a:t>2021-02-06</a:t>
+              <a:t>2021-03-16</a:t>
             </a:fld>
             <a:endParaRPr lang="ko-KR" altLang="en-US"/>
           </a:p>
@@ -1924,7 +1924,7 @@
           <a:p>
             <a:fld id="{E4F1AEBE-7935-4C38-B7AE-36725F38EF0D}" type="datetimeFigureOut">
               <a:rPr lang="ko-KR" altLang="en-US" smtClean="0"/>
-              <a:t>2021-02-06</a:t>
+              <a:t>2021-03-16</a:t>
             </a:fld>
             <a:endParaRPr lang="ko-KR" altLang="en-US"/>
           </a:p>
@@ -2336,7 +2336,7 @@
           <a:p>
             <a:fld id="{E4F1AEBE-7935-4C38-B7AE-36725F38EF0D}" type="datetimeFigureOut">
               <a:rPr lang="ko-KR" altLang="en-US" smtClean="0"/>
-              <a:t>2021-02-06</a:t>
+              <a:t>2021-03-16</a:t>
             </a:fld>
             <a:endParaRPr lang="ko-KR" altLang="en-US"/>
           </a:p>
@@ -2477,7 +2477,7 @@
           <a:p>
             <a:fld id="{E4F1AEBE-7935-4C38-B7AE-36725F38EF0D}" type="datetimeFigureOut">
               <a:rPr lang="ko-KR" altLang="en-US" smtClean="0"/>
-              <a:t>2021-02-06</a:t>
+              <a:t>2021-03-16</a:t>
             </a:fld>
             <a:endParaRPr lang="ko-KR" altLang="en-US"/>
           </a:p>
@@ -2590,7 +2590,7 @@
           <a:p>
             <a:fld id="{E4F1AEBE-7935-4C38-B7AE-36725F38EF0D}" type="datetimeFigureOut">
               <a:rPr lang="ko-KR" altLang="en-US" smtClean="0"/>
-              <a:t>2021-02-06</a:t>
+              <a:t>2021-03-16</a:t>
             </a:fld>
             <a:endParaRPr lang="ko-KR" altLang="en-US"/>
           </a:p>
@@ -2901,7 +2901,7 @@
           <a:p>
             <a:fld id="{E4F1AEBE-7935-4C38-B7AE-36725F38EF0D}" type="datetimeFigureOut">
               <a:rPr lang="ko-KR" altLang="en-US" smtClean="0"/>
-              <a:t>2021-02-06</a:t>
+              <a:t>2021-03-16</a:t>
             </a:fld>
             <a:endParaRPr lang="ko-KR" altLang="en-US"/>
           </a:p>
@@ -3189,7 +3189,7 @@
           <a:p>
             <a:fld id="{E4F1AEBE-7935-4C38-B7AE-36725F38EF0D}" type="datetimeFigureOut">
               <a:rPr lang="ko-KR" altLang="en-US" smtClean="0"/>
-              <a:t>2021-02-06</a:t>
+              <a:t>2021-03-16</a:t>
             </a:fld>
             <a:endParaRPr lang="ko-KR" altLang="en-US"/>
           </a:p>
@@ -3430,7 +3430,7 @@
           <a:p>
             <a:fld id="{E4F1AEBE-7935-4C38-B7AE-36725F38EF0D}" type="datetimeFigureOut">
               <a:rPr lang="ko-KR" altLang="en-US" smtClean="0"/>
-              <a:t>2021-02-06</a:t>
+              <a:t>2021-03-16</a:t>
             </a:fld>
             <a:endParaRPr lang="ko-KR" altLang="en-US"/>
           </a:p>
@@ -3862,7 +3862,7 @@
         <p:spPr>
           <a:xfrm>
             <a:off x="619957" y="1462021"/>
-            <a:ext cx="2753558" cy="4850001"/>
+            <a:ext cx="2753558" cy="5395978"/>
           </a:xfrm>
           <a:prstGeom prst="rect">
             <a:avLst/>
@@ -3981,7 +3981,11 @@
           <a:lstStyle/>
           <a:p>
             <a:pPr algn="ctr"/>
-            <a:endParaRPr lang="ko-KR" altLang="en-US"/>
+            <a:r>
+              <a:rPr lang="en-US" altLang="ko-KR" dirty="0"/>
+              <a:t> </a:t>
+            </a:r>
+            <a:endParaRPr lang="ko-KR" altLang="en-US" dirty="0"/>
           </a:p>
         </p:txBody>
       </p:sp>
@@ -4168,6 +4172,356 @@
           <a:p>
             <a:pPr algn="ctr"/>
             <a:endParaRPr lang="ko-KR" altLang="en-US"/>
+          </a:p>
+        </p:txBody>
+      </p:sp>
+      <p:sp>
+        <p:nvSpPr>
+          <p:cNvPr id="11" name="직사각형 10">
+            <a:extLst>
+              <a:ext uri="{FF2B5EF4-FFF2-40B4-BE49-F238E27FC236}">
+                <a16:creationId xmlns:a16="http://schemas.microsoft.com/office/drawing/2014/main" id="{F2877E83-4A1B-48CA-AA26-8CC9AC68D3BD}"/>
+              </a:ext>
+            </a:extLst>
+          </p:cNvPr>
+          <p:cNvSpPr/>
+          <p:nvPr/>
+        </p:nvSpPr>
+        <p:spPr>
+          <a:xfrm>
+            <a:off x="725749" y="1529345"/>
+            <a:ext cx="1073827" cy="1703891"/>
+          </a:xfrm>
+          <a:prstGeom prst="rect">
+            <a:avLst/>
+          </a:prstGeom>
+        </p:spPr>
+        <p:style>
+          <a:lnRef idx="2">
+            <a:schemeClr val="accent1">
+              <a:shade val="50000"/>
+            </a:schemeClr>
+          </a:lnRef>
+          <a:fillRef idx="1">
+            <a:schemeClr val="accent1"/>
+          </a:fillRef>
+          <a:effectRef idx="0">
+            <a:schemeClr val="accent1"/>
+          </a:effectRef>
+          <a:fontRef idx="minor">
+            <a:schemeClr val="lt1"/>
+          </a:fontRef>
+        </p:style>
+        <p:txBody>
+          <a:bodyPr rtlCol="0" anchor="ctr"/>
+          <a:lstStyle/>
+          <a:p>
+            <a:pPr algn="ctr"/>
+            <a:r>
+              <a:rPr lang="en-US" altLang="ko-KR" dirty="0"/>
+              <a:t> </a:t>
+            </a:r>
+            <a:endParaRPr lang="ko-KR" altLang="en-US" dirty="0"/>
+          </a:p>
+        </p:txBody>
+      </p:sp>
+      <p:sp>
+        <p:nvSpPr>
+          <p:cNvPr id="12" name="직사각형 11">
+            <a:extLst>
+              <a:ext uri="{FF2B5EF4-FFF2-40B4-BE49-F238E27FC236}">
+                <a16:creationId xmlns:a16="http://schemas.microsoft.com/office/drawing/2014/main" id="{9CE2F6D5-EB09-4EC6-BD95-553F53FFE664}"/>
+              </a:ext>
+            </a:extLst>
+          </p:cNvPr>
+          <p:cNvSpPr/>
+          <p:nvPr/>
+        </p:nvSpPr>
+        <p:spPr>
+          <a:xfrm>
+            <a:off x="1921893" y="1529345"/>
+            <a:ext cx="600598" cy="179647"/>
+          </a:xfrm>
+          <a:prstGeom prst="rect">
+            <a:avLst/>
+          </a:prstGeom>
+        </p:spPr>
+        <p:style>
+          <a:lnRef idx="2">
+            <a:schemeClr val="accent1">
+              <a:shade val="50000"/>
+            </a:schemeClr>
+          </a:lnRef>
+          <a:fillRef idx="1">
+            <a:schemeClr val="accent1"/>
+          </a:fillRef>
+          <a:effectRef idx="0">
+            <a:schemeClr val="accent1"/>
+          </a:effectRef>
+          <a:fontRef idx="minor">
+            <a:schemeClr val="lt1"/>
+          </a:fontRef>
+        </p:style>
+        <p:txBody>
+          <a:bodyPr rtlCol="0" anchor="ctr"/>
+          <a:lstStyle/>
+          <a:p>
+            <a:pPr algn="ctr"/>
+            <a:r>
+              <a:rPr lang="en-US" altLang="ko-KR" dirty="0"/>
+              <a:t> </a:t>
+            </a:r>
+            <a:endParaRPr lang="ko-KR" altLang="en-US" dirty="0"/>
+          </a:p>
+        </p:txBody>
+      </p:sp>
+      <p:sp>
+        <p:nvSpPr>
+          <p:cNvPr id="13" name="직사각형 12">
+            <a:extLst>
+              <a:ext uri="{FF2B5EF4-FFF2-40B4-BE49-F238E27FC236}">
+                <a16:creationId xmlns:a16="http://schemas.microsoft.com/office/drawing/2014/main" id="{1CD34DCD-4E60-4E41-AAEE-3D4FC6807040}"/>
+              </a:ext>
+            </a:extLst>
+          </p:cNvPr>
+          <p:cNvSpPr/>
+          <p:nvPr/>
+        </p:nvSpPr>
+        <p:spPr>
+          <a:xfrm>
+            <a:off x="1921892" y="1872779"/>
+            <a:ext cx="1329307" cy="179647"/>
+          </a:xfrm>
+          <a:prstGeom prst="rect">
+            <a:avLst/>
+          </a:prstGeom>
+        </p:spPr>
+        <p:style>
+          <a:lnRef idx="2">
+            <a:schemeClr val="accent1">
+              <a:shade val="50000"/>
+            </a:schemeClr>
+          </a:lnRef>
+          <a:fillRef idx="1">
+            <a:schemeClr val="accent1"/>
+          </a:fillRef>
+          <a:effectRef idx="0">
+            <a:schemeClr val="accent1"/>
+          </a:effectRef>
+          <a:fontRef idx="minor">
+            <a:schemeClr val="lt1"/>
+          </a:fontRef>
+        </p:style>
+        <p:txBody>
+          <a:bodyPr rtlCol="0" anchor="ctr"/>
+          <a:lstStyle/>
+          <a:p>
+            <a:pPr algn="ctr"/>
+            <a:r>
+              <a:rPr lang="en-US" altLang="ko-KR" dirty="0"/>
+              <a:t> </a:t>
+            </a:r>
+            <a:endParaRPr lang="ko-KR" altLang="en-US" dirty="0"/>
+          </a:p>
+        </p:txBody>
+      </p:sp>
+      <p:sp>
+        <p:nvSpPr>
+          <p:cNvPr id="14" name="직사각형 13">
+            <a:extLst>
+              <a:ext uri="{FF2B5EF4-FFF2-40B4-BE49-F238E27FC236}">
+                <a16:creationId xmlns:a16="http://schemas.microsoft.com/office/drawing/2014/main" id="{7DDA16A1-0F99-489E-BF50-076F4783EBEE}"/>
+              </a:ext>
+            </a:extLst>
+          </p:cNvPr>
+          <p:cNvSpPr/>
+          <p:nvPr/>
+        </p:nvSpPr>
+        <p:spPr>
+          <a:xfrm>
+            <a:off x="1921892" y="2174372"/>
+            <a:ext cx="600599" cy="179647"/>
+          </a:xfrm>
+          <a:prstGeom prst="rect">
+            <a:avLst/>
+          </a:prstGeom>
+        </p:spPr>
+        <p:style>
+          <a:lnRef idx="2">
+            <a:schemeClr val="accent1">
+              <a:shade val="50000"/>
+            </a:schemeClr>
+          </a:lnRef>
+          <a:fillRef idx="1">
+            <a:schemeClr val="accent1"/>
+          </a:fillRef>
+          <a:effectRef idx="0">
+            <a:schemeClr val="accent1"/>
+          </a:effectRef>
+          <a:fontRef idx="minor">
+            <a:schemeClr val="lt1"/>
+          </a:fontRef>
+        </p:style>
+        <p:txBody>
+          <a:bodyPr rtlCol="0" anchor="ctr"/>
+          <a:lstStyle/>
+          <a:p>
+            <a:pPr algn="ctr"/>
+            <a:r>
+              <a:rPr lang="en-US" altLang="ko-KR" dirty="0"/>
+              <a:t> </a:t>
+            </a:r>
+            <a:endParaRPr lang="ko-KR" altLang="en-US" dirty="0"/>
+          </a:p>
+        </p:txBody>
+      </p:sp>
+      <p:sp>
+        <p:nvSpPr>
+          <p:cNvPr id="15" name="직사각형 14">
+            <a:extLst>
+              <a:ext uri="{FF2B5EF4-FFF2-40B4-BE49-F238E27FC236}">
+                <a16:creationId xmlns:a16="http://schemas.microsoft.com/office/drawing/2014/main" id="{D033CE3B-5EDB-4FC6-B90A-A3A13003A218}"/>
+              </a:ext>
+            </a:extLst>
+          </p:cNvPr>
+          <p:cNvSpPr/>
+          <p:nvPr/>
+        </p:nvSpPr>
+        <p:spPr>
+          <a:xfrm>
+            <a:off x="1921892" y="2463184"/>
+            <a:ext cx="1329307" cy="179647"/>
+          </a:xfrm>
+          <a:prstGeom prst="rect">
+            <a:avLst/>
+          </a:prstGeom>
+        </p:spPr>
+        <p:style>
+          <a:lnRef idx="2">
+            <a:schemeClr val="accent1">
+              <a:shade val="50000"/>
+            </a:schemeClr>
+          </a:lnRef>
+          <a:fillRef idx="1">
+            <a:schemeClr val="accent1"/>
+          </a:fillRef>
+          <a:effectRef idx="0">
+            <a:schemeClr val="accent1"/>
+          </a:effectRef>
+          <a:fontRef idx="minor">
+            <a:schemeClr val="lt1"/>
+          </a:fontRef>
+        </p:style>
+        <p:txBody>
+          <a:bodyPr rtlCol="0" anchor="ctr"/>
+          <a:lstStyle/>
+          <a:p>
+            <a:pPr algn="ctr"/>
+            <a:r>
+              <a:rPr lang="en-US" altLang="ko-KR" dirty="0"/>
+              <a:t> </a:t>
+            </a:r>
+            <a:endParaRPr lang="ko-KR" altLang="en-US" dirty="0"/>
+          </a:p>
+        </p:txBody>
+      </p:sp>
+      <p:sp>
+        <p:nvSpPr>
+          <p:cNvPr id="16" name="직사각형 15">
+            <a:extLst>
+              <a:ext uri="{FF2B5EF4-FFF2-40B4-BE49-F238E27FC236}">
+                <a16:creationId xmlns:a16="http://schemas.microsoft.com/office/drawing/2014/main" id="{5FB17771-E0DA-408F-8221-85BD377FE50A}"/>
+              </a:ext>
+            </a:extLst>
+          </p:cNvPr>
+          <p:cNvSpPr/>
+          <p:nvPr/>
+        </p:nvSpPr>
+        <p:spPr>
+          <a:xfrm>
+            <a:off x="1932680" y="2751996"/>
+            <a:ext cx="589811" cy="179647"/>
+          </a:xfrm>
+          <a:prstGeom prst="rect">
+            <a:avLst/>
+          </a:prstGeom>
+        </p:spPr>
+        <p:style>
+          <a:lnRef idx="2">
+            <a:schemeClr val="accent1">
+              <a:shade val="50000"/>
+            </a:schemeClr>
+          </a:lnRef>
+          <a:fillRef idx="1">
+            <a:schemeClr val="accent1"/>
+          </a:fillRef>
+          <a:effectRef idx="0">
+            <a:schemeClr val="accent1"/>
+          </a:effectRef>
+          <a:fontRef idx="minor">
+            <a:schemeClr val="lt1"/>
+          </a:fontRef>
+        </p:style>
+        <p:txBody>
+          <a:bodyPr rtlCol="0" anchor="ctr"/>
+          <a:lstStyle/>
+          <a:p>
+            <a:pPr algn="ctr"/>
+            <a:r>
+              <a:rPr lang="en-US" altLang="ko-KR" dirty="0"/>
+              <a:t> </a:t>
+            </a:r>
+            <a:endParaRPr lang="ko-KR" altLang="en-US" dirty="0"/>
+          </a:p>
+        </p:txBody>
+      </p:sp>
+      <p:sp>
+        <p:nvSpPr>
+          <p:cNvPr id="17" name="직사각형 16">
+            <a:extLst>
+              <a:ext uri="{FF2B5EF4-FFF2-40B4-BE49-F238E27FC236}">
+                <a16:creationId xmlns:a16="http://schemas.microsoft.com/office/drawing/2014/main" id="{D96BD3F5-5411-4208-BF24-E1BFD8401376}"/>
+              </a:ext>
+            </a:extLst>
+          </p:cNvPr>
+          <p:cNvSpPr/>
+          <p:nvPr/>
+        </p:nvSpPr>
+        <p:spPr>
+          <a:xfrm>
+            <a:off x="1921892" y="3053589"/>
+            <a:ext cx="1329307" cy="179647"/>
+          </a:xfrm>
+          <a:prstGeom prst="rect">
+            <a:avLst/>
+          </a:prstGeom>
+        </p:spPr>
+        <p:style>
+          <a:lnRef idx="2">
+            <a:schemeClr val="accent1">
+              <a:shade val="50000"/>
+            </a:schemeClr>
+          </a:lnRef>
+          <a:fillRef idx="1">
+            <a:schemeClr val="accent1"/>
+          </a:fillRef>
+          <a:effectRef idx="0">
+            <a:schemeClr val="accent1"/>
+          </a:effectRef>
+          <a:fontRef idx="minor">
+            <a:schemeClr val="lt1"/>
+          </a:fontRef>
+        </p:style>
+        <p:txBody>
+          <a:bodyPr rtlCol="0" anchor="ctr"/>
+          <a:lstStyle/>
+          <a:p>
+            <a:pPr algn="ctr"/>
+            <a:r>
+              <a:rPr lang="en-US" altLang="ko-KR" dirty="0"/>
+              <a:t> </a:t>
+            </a:r>
+            <a:endParaRPr lang="ko-KR" altLang="en-US" dirty="0"/>
           </a:p>
         </p:txBody>
       </p:sp>

</xml_diff>